<commit_message>
DG:  appointment related update
</commit_message>
<xml_diff>
--- a/docs/diagrams/AppointmentClassDemo3.pptx
+++ b/docs/diagrams/AppointmentClassDemo3.pptx
@@ -3402,367 +3402,401 @@
           <a:chExt cx="0" cy="0"/>
         </a:xfrm>
       </p:grpSpPr>
-      <p:sp>
-        <p:nvSpPr>
-          <p:cNvPr id="118" name="Rectangle 65"/>
-          <p:cNvSpPr/>
+      <p:grpSp>
+        <p:nvGrpSpPr>
+          <p:cNvPr id="2" name="组合 1"/>
+          <p:cNvGrpSpPr/>
           <p:nvPr/>
-        </p:nvSpPr>
-        <p:spPr>
+        </p:nvGrpSpPr>
+        <p:grpSpPr>
           <a:xfrm>
-            <a:off x="817880" y="1042670"/>
-            <a:ext cx="6746875" cy="4040505"/>
+            <a:off x="782955" y="1047115"/>
+            <a:ext cx="6746240" cy="4039870"/>
+            <a:chOff x="1233" y="1649"/>
+            <a:chExt cx="10624" cy="6362"/>
           </a:xfrm>
-          <a:prstGeom prst="roundRect">
-            <a:avLst>
-              <a:gd name="adj" fmla="val 3484"/>
-            </a:avLst>
-          </a:prstGeom>
-          <a:solidFill>
-            <a:schemeClr val="accent4">
-              <a:lumMod val="20000"/>
-              <a:lumOff val="80000"/>
-            </a:schemeClr>
-          </a:solidFill>
-          <a:ln w="19050">
-            <a:noFill/>
-          </a:ln>
-          <a:effectLst/>
-        </p:spPr>
-        <p:style>
-          <a:lnRef idx="1">
-            <a:schemeClr val="accent2"/>
-          </a:lnRef>
-          <a:fillRef idx="2">
-            <a:schemeClr val="accent2"/>
-          </a:fillRef>
-          <a:effectRef idx="1">
-            <a:schemeClr val="accent2"/>
-          </a:effectRef>
-          <a:fontRef idx="minor">
-            <a:schemeClr val="dk1"/>
-          </a:fontRef>
-        </p:style>
-        <p:txBody>
-          <a:bodyPr rtlCol="0" anchor="t"/>
-          <a:lstStyle/>
-          <a:p>
-            <a:r>
-              <a:rPr lang="en-US" sz="1200" b="1" dirty="0" smtClean="0">
+        </p:grpSpPr>
+        <p:sp>
+          <p:nvSpPr>
+            <p:cNvPr id="118" name="Rectangle 65"/>
+            <p:cNvSpPr/>
+            <p:nvPr/>
+          </p:nvSpPr>
+          <p:spPr>
+            <a:xfrm>
+              <a:off x="1233" y="1649"/>
+              <a:ext cx="10625" cy="6363"/>
+            </a:xfrm>
+            <a:prstGeom prst="roundRect">
+              <a:avLst>
+                <a:gd name="adj" fmla="val 3484"/>
+              </a:avLst>
+            </a:prstGeom>
+            <a:solidFill>
+              <a:schemeClr val="accent4">
+                <a:lumMod val="20000"/>
+                <a:lumOff val="80000"/>
+              </a:schemeClr>
+            </a:solidFill>
+            <a:ln w="19050">
+              <a:noFill/>
+            </a:ln>
+            <a:effectLst/>
+          </p:spPr>
+          <p:style>
+            <a:lnRef idx="1">
+              <a:schemeClr val="accent2"/>
+            </a:lnRef>
+            <a:fillRef idx="2">
+              <a:schemeClr val="accent2"/>
+            </a:fillRef>
+            <a:effectRef idx="1">
+              <a:schemeClr val="accent2"/>
+            </a:effectRef>
+            <a:fontRef idx="minor">
+              <a:schemeClr val="dk1"/>
+            </a:fontRef>
+          </p:style>
+          <p:txBody>
+            <a:bodyPr rtlCol="0" anchor="t"/>
+            <a:lstStyle/>
+            <a:p>
+              <a:r>
+                <a:rPr lang="en-US" sz="1200" b="1" dirty="0" smtClean="0">
+                  <a:solidFill>
+                    <a:srgbClr val="7030A0"/>
+                  </a:solidFill>
+                </a:rPr>
+                <a:t>Model</a:t>
+              </a:r>
+              <a:endParaRPr lang="en-SG" sz="1200" b="1" dirty="0">
                 <a:solidFill>
                   <a:srgbClr val="7030A0"/>
                 </a:solidFill>
-              </a:rPr>
-              <a:t>Model</a:t>
-            </a:r>
-            <a:endParaRPr lang="en-SG" sz="1200" b="1" dirty="0">
+              </a:endParaRPr>
+            </a:p>
+          </p:txBody>
+        </p:sp>
+        <p:sp>
+          <p:nvSpPr>
+            <p:cNvPr id="54" name="TextBox 53"/>
+            <p:cNvSpPr txBox="1"/>
+            <p:nvPr/>
+          </p:nvSpPr>
+          <p:spPr>
+            <a:xfrm>
+              <a:off x="3338" y="3473"/>
+              <a:ext cx="324" cy="302"/>
+            </a:xfrm>
+            <a:prstGeom prst="rect">
+              <a:avLst/>
+            </a:prstGeom>
+            <a:noFill/>
+          </p:spPr>
+          <p:txBody>
+            <a:bodyPr wrap="square" lIns="0" tIns="0" rIns="0" bIns="0" rtlCol="0">
+              <a:noAutofit/>
+            </a:bodyPr>
+            <a:lstStyle/>
+            <a:p>
+              <a:pPr algn="ctr"/>
+              <a:endParaRPr lang="en-SG" sz="1100" dirty="0">
+                <a:solidFill>
+                  <a:srgbClr val="7030A0"/>
+                </a:solidFill>
+              </a:endParaRPr>
+            </a:p>
+          </p:txBody>
+        </p:sp>
+        <p:sp>
+          <p:nvSpPr>
+            <p:cNvPr id="70" name="TextBox 69"/>
+            <p:cNvSpPr txBox="1"/>
+            <p:nvPr/>
+          </p:nvSpPr>
+          <p:spPr>
+            <a:xfrm>
+              <a:off x="7346" y="3729"/>
+              <a:ext cx="324" cy="302"/>
+            </a:xfrm>
+            <a:prstGeom prst="rect">
+              <a:avLst/>
+            </a:prstGeom>
+            <a:noFill/>
+          </p:spPr>
+          <p:txBody>
+            <a:bodyPr wrap="square" lIns="0" tIns="0" rIns="0" bIns="0" rtlCol="0">
+              <a:noAutofit/>
+            </a:bodyPr>
+            <a:lstStyle/>
+            <a:p>
+              <a:pPr algn="ctr"/>
+              <a:endParaRPr lang="en-SG" sz="1100" dirty="0">
+                <a:solidFill>
+                  <a:srgbClr val="7030A0"/>
+                </a:solidFill>
+              </a:endParaRPr>
+            </a:p>
+          </p:txBody>
+        </p:sp>
+        <p:sp>
+          <p:nvSpPr>
+            <p:cNvPr id="8" name="Rectangle 8"/>
+            <p:cNvSpPr/>
+            <p:nvPr/>
+          </p:nvSpPr>
+          <p:spPr>
+            <a:xfrm>
+              <a:off x="4864" y="2538"/>
+              <a:ext cx="3152" cy="3953"/>
+            </a:xfrm>
+            <a:prstGeom prst="rect">
+              <a:avLst/>
+            </a:prstGeom>
+            <a:ln w="19050">
               <a:solidFill>
                 <a:srgbClr val="7030A0"/>
               </a:solidFill>
-            </a:endParaRPr>
-          </a:p>
-        </p:txBody>
-      </p:sp>
-      <p:sp>
-        <p:nvSpPr>
-          <p:cNvPr id="54" name="TextBox 53"/>
-          <p:cNvSpPr txBox="1"/>
-          <p:nvPr/>
-        </p:nvSpPr>
-        <p:spPr>
-          <a:xfrm>
-            <a:off x="2119630" y="2205355"/>
-            <a:ext cx="205740" cy="191770"/>
-          </a:xfrm>
-          <a:prstGeom prst="rect">
-            <a:avLst/>
-          </a:prstGeom>
-          <a:noFill/>
-        </p:spPr>
-        <p:txBody>
-          <a:bodyPr wrap="square" lIns="0" tIns="0" rIns="0" bIns="0" rtlCol="0">
-            <a:noAutofit/>
-          </a:bodyPr>
-          <a:lstStyle/>
-          <a:p>
-            <a:pPr algn="ctr"/>
-            <a:endParaRPr lang="en-SG" sz="1100" dirty="0">
+            </a:ln>
+            <a:effectLst/>
+          </p:spPr>
+          <p:style>
+            <a:lnRef idx="1">
+              <a:schemeClr val="accent4"/>
+            </a:lnRef>
+            <a:fillRef idx="2">
+              <a:schemeClr val="accent4"/>
+            </a:fillRef>
+            <a:effectRef idx="1">
+              <a:schemeClr val="accent4"/>
+            </a:effectRef>
+            <a:fontRef idx="minor">
+              <a:schemeClr val="dk1"/>
+            </a:fontRef>
+          </p:style>
+          <p:txBody>
+            <a:bodyPr rtlCol="0" anchor="ctr"/>
+            <a:p>
+              <a:pPr algn="l"/>
+              <a:endParaRPr lang="en-US" sz="1050" dirty="0">
+                <a:solidFill>
+                  <a:srgbClr val="7030A0"/>
+                </a:solidFill>
+              </a:endParaRPr>
+            </a:p>
+          </p:txBody>
+        </p:sp>
+        <p:cxnSp>
+          <p:nvCxnSpPr>
+            <p:cNvPr id="9" name="肘形连接符 8"/>
+            <p:cNvCxnSpPr/>
+            <p:nvPr/>
+          </p:nvCxnSpPr>
+          <p:spPr>
+            <a:xfrm>
+              <a:off x="4886" y="3281"/>
+              <a:ext cx="3129" cy="5"/>
+            </a:xfrm>
+            <a:prstGeom prst="bentConnector2">
+              <a:avLst/>
+            </a:prstGeom>
+            <a:ln>
               <a:solidFill>
-                <a:srgbClr val="7030A0"/>
+                <a:schemeClr val="accent4"/>
               </a:solidFill>
-            </a:endParaRPr>
-          </a:p>
-        </p:txBody>
-      </p:sp>
-      <p:sp>
-        <p:nvSpPr>
-          <p:cNvPr id="70" name="TextBox 69"/>
-          <p:cNvSpPr txBox="1"/>
-          <p:nvPr/>
-        </p:nvSpPr>
-        <p:spPr>
-          <a:xfrm>
-            <a:off x="4664710" y="2367915"/>
-            <a:ext cx="205740" cy="191770"/>
-          </a:xfrm>
-          <a:prstGeom prst="rect">
-            <a:avLst/>
-          </a:prstGeom>
-          <a:noFill/>
-        </p:spPr>
-        <p:txBody>
-          <a:bodyPr wrap="square" lIns="0" tIns="0" rIns="0" bIns="0" rtlCol="0">
-            <a:noAutofit/>
-          </a:bodyPr>
-          <a:lstStyle/>
-          <a:p>
-            <a:pPr algn="ctr"/>
-            <a:endParaRPr lang="en-SG" sz="1100" dirty="0">
+            </a:ln>
+          </p:spPr>
+          <p:style>
+            <a:lnRef idx="1">
+              <a:schemeClr val="accent1"/>
+            </a:lnRef>
+            <a:fillRef idx="0">
+              <a:schemeClr val="accent1"/>
+            </a:fillRef>
+            <a:effectRef idx="0">
+              <a:schemeClr val="accent1"/>
+            </a:effectRef>
+            <a:fontRef idx="minor">
+              <a:schemeClr val="tx1"/>
+            </a:fontRef>
+          </p:style>
+        </p:cxnSp>
+        <p:sp>
+          <p:nvSpPr>
+            <p:cNvPr id="10" name="文本框 9"/>
+            <p:cNvSpPr txBox="1"/>
+            <p:nvPr/>
+          </p:nvSpPr>
+          <p:spPr>
+            <a:xfrm>
+              <a:off x="5083" y="2664"/>
+              <a:ext cx="2737" cy="580"/>
+            </a:xfrm>
+            <a:prstGeom prst="rect">
+              <a:avLst/>
+            </a:prstGeom>
+            <a:noFill/>
+          </p:spPr>
+          <p:txBody>
+            <a:bodyPr wrap="square" rtlCol="0">
+              <a:spAutoFit/>
+            </a:bodyPr>
+            <a:p>
+              <a:r>
+                <a:rPr lang="en-US" altLang="zh-CN" b="1"/>
+                <a:t>Appointment</a:t>
+              </a:r>
+              <a:endParaRPr lang="en-US" altLang="zh-CN" b="1"/>
+            </a:p>
+          </p:txBody>
+        </p:sp>
+        <p:sp>
+          <p:nvSpPr>
+            <p:cNvPr id="11" name="文本框 10"/>
+            <p:cNvSpPr txBox="1"/>
+            <p:nvPr/>
+          </p:nvSpPr>
+          <p:spPr>
+            <a:xfrm>
+              <a:off x="4886" y="3281"/>
+              <a:ext cx="3083" cy="1501"/>
+            </a:xfrm>
+            <a:prstGeom prst="rect">
+              <a:avLst/>
+            </a:prstGeom>
+            <a:noFill/>
+          </p:spPr>
+          <p:txBody>
+            <a:bodyPr wrap="square" rtlCol="0">
+              <a:spAutoFit/>
+            </a:bodyPr>
+            <a:p>
+              <a:r>
+                <a:rPr lang="en-US" altLang="zh-CN" sz="1400"/>
+                <a:t>date: Date</a:t>
+              </a:r>
+              <a:endParaRPr lang="en-US" altLang="zh-CN" sz="1400"/>
+            </a:p>
+            <a:p>
+              <a:r>
+                <a:rPr lang="en-US" altLang="zh-CN" sz="1400"/>
+                <a:t>time: Time</a:t>
+              </a:r>
+              <a:endParaRPr lang="en-US" altLang="zh-CN" sz="1400"/>
+            </a:p>
+            <a:p>
+              <a:r>
+                <a:rPr lang="en-US" altLang="zh-CN" sz="1400"/>
+                <a:t>duration: Duration</a:t>
+              </a:r>
+              <a:endParaRPr lang="en-US" altLang="zh-CN" sz="1400"/>
+            </a:p>
+            <a:p>
+              <a:r>
+                <a:rPr lang="en-US" altLang="zh-CN" sz="1400"/>
+                <a:t>description: Description</a:t>
+              </a:r>
+              <a:endParaRPr lang="en-US" altLang="zh-CN" sz="1400"/>
+            </a:p>
+          </p:txBody>
+        </p:sp>
+        <p:cxnSp>
+          <p:nvCxnSpPr>
+            <p:cNvPr id="12" name="肘形连接符 11"/>
+            <p:cNvCxnSpPr/>
+            <p:nvPr/>
+          </p:nvCxnSpPr>
+          <p:spPr>
+            <a:xfrm>
+              <a:off x="4887" y="5026"/>
+              <a:ext cx="3129" cy="5"/>
+            </a:xfrm>
+            <a:prstGeom prst="bentConnector2">
+              <a:avLst/>
+            </a:prstGeom>
+            <a:ln>
               <a:solidFill>
-                <a:srgbClr val="7030A0"/>
+                <a:schemeClr val="accent4"/>
               </a:solidFill>
-            </a:endParaRPr>
-          </a:p>
-        </p:txBody>
-      </p:sp>
-      <p:sp>
-        <p:nvSpPr>
-          <p:cNvPr id="8" name="Rectangle 8"/>
-          <p:cNvSpPr/>
-          <p:nvPr/>
-        </p:nvSpPr>
-        <p:spPr>
-          <a:xfrm>
-            <a:off x="3088640" y="1611630"/>
-            <a:ext cx="2001520" cy="2510155"/>
-          </a:xfrm>
-          <a:prstGeom prst="rect">
-            <a:avLst/>
-          </a:prstGeom>
-          <a:ln w="19050">
-            <a:solidFill>
-              <a:srgbClr val="7030A0"/>
-            </a:solidFill>
-          </a:ln>
-          <a:effectLst/>
-        </p:spPr>
-        <p:style>
-          <a:lnRef idx="1">
-            <a:schemeClr val="accent4"/>
-          </a:lnRef>
-          <a:fillRef idx="2">
-            <a:schemeClr val="accent4"/>
-          </a:fillRef>
-          <a:effectRef idx="1">
-            <a:schemeClr val="accent4"/>
-          </a:effectRef>
-          <a:fontRef idx="minor">
-            <a:schemeClr val="dk1"/>
-          </a:fontRef>
-        </p:style>
-        <p:txBody>
-          <a:bodyPr rtlCol="0" anchor="ctr"/>
-          <a:p>
-            <a:pPr algn="l"/>
-            <a:endParaRPr lang="en-US" sz="1050" dirty="0">
-              <a:solidFill>
-                <a:srgbClr val="7030A0"/>
-              </a:solidFill>
-            </a:endParaRPr>
-          </a:p>
-        </p:txBody>
-      </p:sp>
-      <p:cxnSp>
-        <p:nvCxnSpPr>
-          <p:cNvPr id="9" name="肘形连接符 8"/>
-          <p:cNvCxnSpPr/>
-          <p:nvPr/>
-        </p:nvCxnSpPr>
-        <p:spPr>
-          <a:xfrm>
-            <a:off x="3102610" y="2083435"/>
-            <a:ext cx="1986915" cy="3175"/>
-          </a:xfrm>
-          <a:prstGeom prst="bentConnector2">
-            <a:avLst/>
-          </a:prstGeom>
-          <a:ln>
-            <a:solidFill>
-              <a:schemeClr val="accent4"/>
-            </a:solidFill>
-          </a:ln>
-        </p:spPr>
-        <p:style>
-          <a:lnRef idx="1">
-            <a:schemeClr val="accent1"/>
-          </a:lnRef>
-          <a:fillRef idx="0">
-            <a:schemeClr val="accent1"/>
-          </a:fillRef>
-          <a:effectRef idx="0">
-            <a:schemeClr val="accent1"/>
-          </a:effectRef>
-          <a:fontRef idx="minor">
-            <a:schemeClr val="tx1"/>
-          </a:fontRef>
-        </p:style>
-      </p:cxnSp>
-      <p:sp>
-        <p:nvSpPr>
-          <p:cNvPr id="10" name="文本框 9"/>
-          <p:cNvSpPr txBox="1"/>
-          <p:nvPr/>
-        </p:nvSpPr>
-        <p:spPr>
-          <a:xfrm>
-            <a:off x="3227705" y="1691640"/>
-            <a:ext cx="1737995" cy="368300"/>
-          </a:xfrm>
-          <a:prstGeom prst="rect">
-            <a:avLst/>
-          </a:prstGeom>
-          <a:noFill/>
-        </p:spPr>
-        <p:txBody>
-          <a:bodyPr wrap="square" rtlCol="0">
-            <a:spAutoFit/>
-          </a:bodyPr>
-          <a:p>
-            <a:r>
-              <a:rPr lang="en-US" altLang="zh-CN" b="1"/>
-              <a:t>Appointment</a:t>
-            </a:r>
-            <a:endParaRPr lang="en-US" altLang="zh-CN" b="1"/>
-          </a:p>
-        </p:txBody>
-      </p:sp>
-      <p:sp>
-        <p:nvSpPr>
-          <p:cNvPr id="11" name="文本框 10"/>
-          <p:cNvSpPr txBox="1"/>
-          <p:nvPr/>
-        </p:nvSpPr>
-        <p:spPr>
-          <a:xfrm>
-            <a:off x="3132455" y="2211705"/>
-            <a:ext cx="1811655" cy="737235"/>
-          </a:xfrm>
-          <a:prstGeom prst="rect">
-            <a:avLst/>
-          </a:prstGeom>
-          <a:noFill/>
-        </p:spPr>
-        <p:txBody>
-          <a:bodyPr wrap="square" rtlCol="0">
-            <a:spAutoFit/>
-          </a:bodyPr>
-          <a:p>
-            <a:r>
-              <a:rPr lang="en-US" altLang="zh-CN" sz="1400"/>
-              <a:t>date: Date</a:t>
-            </a:r>
-            <a:endParaRPr lang="en-US" altLang="zh-CN" sz="1400"/>
-          </a:p>
-          <a:p>
-            <a:r>
-              <a:rPr lang="en-US" altLang="zh-CN" sz="1400"/>
-              <a:t>time: Time</a:t>
-            </a:r>
-            <a:endParaRPr lang="en-US" altLang="zh-CN" sz="1400"/>
-          </a:p>
-          <a:p>
-            <a:r>
-              <a:rPr lang="en-US" altLang="zh-CN" sz="1400"/>
-              <a:t>duration: Duration</a:t>
-            </a:r>
-            <a:endParaRPr lang="en-US" altLang="zh-CN" sz="1400"/>
-          </a:p>
-        </p:txBody>
-      </p:sp>
-      <p:cxnSp>
-        <p:nvCxnSpPr>
-          <p:cNvPr id="12" name="肘形连接符 11"/>
-          <p:cNvCxnSpPr/>
-          <p:nvPr/>
-        </p:nvCxnSpPr>
-        <p:spPr>
-          <a:xfrm>
-            <a:off x="3103245" y="3191510"/>
-            <a:ext cx="1986915" cy="3175"/>
-          </a:xfrm>
-          <a:prstGeom prst="bentConnector2">
-            <a:avLst/>
-          </a:prstGeom>
-          <a:ln>
-            <a:solidFill>
-              <a:schemeClr val="accent4"/>
-            </a:solidFill>
-          </a:ln>
-        </p:spPr>
-        <p:style>
-          <a:lnRef idx="1">
-            <a:schemeClr val="accent1"/>
-          </a:lnRef>
-          <a:fillRef idx="0">
-            <a:schemeClr val="accent1"/>
-          </a:fillRef>
-          <a:effectRef idx="0">
-            <a:schemeClr val="accent1"/>
-          </a:effectRef>
-          <a:fontRef idx="minor">
-            <a:schemeClr val="tx1"/>
-          </a:fontRef>
-        </p:style>
-      </p:cxnSp>
-      <p:sp>
-        <p:nvSpPr>
-          <p:cNvPr id="13" name="文本框 12"/>
-          <p:cNvSpPr txBox="1"/>
-          <p:nvPr/>
-        </p:nvSpPr>
-        <p:spPr>
-          <a:xfrm>
-            <a:off x="3132455" y="3268345"/>
-            <a:ext cx="1896745" cy="1168400"/>
-          </a:xfrm>
-          <a:prstGeom prst="rect">
-            <a:avLst/>
-          </a:prstGeom>
-          <a:noFill/>
-        </p:spPr>
-        <p:txBody>
-          <a:bodyPr wrap="square" rtlCol="0">
-            <a:spAutoFit/>
-          </a:bodyPr>
-          <a:p>
-            <a:r>
-              <a:rPr lang="en-US" altLang="zh-CN" sz="1400"/>
-              <a:t>getDate(): Date</a:t>
-            </a:r>
-            <a:endParaRPr lang="en-US" altLang="zh-CN" sz="1400"/>
-          </a:p>
-          <a:p>
-            <a:r>
-              <a:rPr lang="en-US" altLang="zh-CN" sz="1400"/>
-              <a:t>getTime(): Time</a:t>
-            </a:r>
-            <a:endParaRPr lang="en-US" altLang="zh-CN" sz="1400"/>
-          </a:p>
-          <a:p>
-            <a:r>
-              <a:rPr lang="en-US" altLang="zh-CN" sz="1400"/>
-              <a:t>getDuration():Duration</a:t>
-            </a:r>
-            <a:endParaRPr lang="en-US" altLang="zh-CN" sz="1400"/>
-          </a:p>
-          <a:p>
-            <a:endParaRPr lang="en-US" altLang="zh-CN" sz="1400"/>
-          </a:p>
-          <a:p>
-            <a:endParaRPr lang="en-US" altLang="zh-CN" sz="1400"/>
-          </a:p>
-        </p:txBody>
-      </p:sp>
+            </a:ln>
+          </p:spPr>
+          <p:style>
+            <a:lnRef idx="1">
+              <a:schemeClr val="accent1"/>
+            </a:lnRef>
+            <a:fillRef idx="0">
+              <a:schemeClr val="accent1"/>
+            </a:fillRef>
+            <a:effectRef idx="0">
+              <a:schemeClr val="accent1"/>
+            </a:effectRef>
+            <a:fontRef idx="minor">
+              <a:schemeClr val="tx1"/>
+            </a:fontRef>
+          </p:style>
+        </p:cxnSp>
+        <p:sp>
+          <p:nvSpPr>
+            <p:cNvPr id="13" name="文本框 12"/>
+            <p:cNvSpPr txBox="1"/>
+            <p:nvPr/>
+          </p:nvSpPr>
+          <p:spPr>
+            <a:xfrm>
+              <a:off x="4887" y="5031"/>
+              <a:ext cx="3316" cy="2349"/>
+            </a:xfrm>
+            <a:prstGeom prst="rect">
+              <a:avLst/>
+            </a:prstGeom>
+            <a:noFill/>
+          </p:spPr>
+          <p:txBody>
+            <a:bodyPr wrap="square" rtlCol="0">
+              <a:spAutoFit/>
+            </a:bodyPr>
+            <a:p>
+              <a:r>
+                <a:rPr lang="en-US" altLang="zh-CN" sz="1300"/>
+                <a:t>getDate(): Date</a:t>
+              </a:r>
+              <a:endParaRPr lang="en-US" altLang="zh-CN" sz="1300"/>
+            </a:p>
+            <a:p>
+              <a:r>
+                <a:rPr lang="en-US" altLang="zh-CN" sz="1300"/>
+                <a:t>getTime(): Time</a:t>
+              </a:r>
+              <a:endParaRPr lang="en-US" altLang="zh-CN" sz="1300"/>
+            </a:p>
+            <a:p>
+              <a:r>
+                <a:rPr lang="en-US" altLang="zh-CN" sz="1300"/>
+                <a:t>getDuration():Duration</a:t>
+              </a:r>
+              <a:endParaRPr lang="en-US" altLang="zh-CN" sz="1300"/>
+            </a:p>
+            <a:p>
+              <a:r>
+                <a:rPr lang="en-US" altLang="zh-CN" sz="1300">
+                  <a:sym typeface="+mn-ea"/>
+                </a:rPr>
+                <a:t>getDescription():Description</a:t>
+              </a:r>
+              <a:endParaRPr lang="en-US" altLang="zh-CN" sz="1300"/>
+            </a:p>
+            <a:p>
+              <a:endParaRPr lang="en-US" altLang="zh-CN" sz="1300"/>
+            </a:p>
+            <a:p>
+              <a:endParaRPr lang="en-US" altLang="zh-CN" sz="1300"/>
+            </a:p>
+            <a:p>
+              <a:endParaRPr lang="en-US" altLang="zh-CN" sz="1300"/>
+            </a:p>
+          </p:txBody>
+        </p:sp>
+      </p:grpSp>
     </p:spTree>
   </p:cSld>
   <p:clrMapOvr>

</xml_diff>